<commit_message>
wrote lesson and fixed error in MovingStraightPy
</commit_message>
<xml_diff>
--- a/en/ProgrammingLessons/MovingStraightPy.pptx
+++ b/en/ProgrammingLessons/MovingStraightPy.pptx
@@ -226,7 +226,7 @@
           <a:p>
             <a:fld id="{F8D9B3D7-15CB-9343-AA49-EFB5A8F33F18}" type="datetimeFigureOut">
               <a:rPr lang="en-US" smtClean="0"/>
-              <a:t>11/8/2020</a:t>
+              <a:t>11/19/2020</a:t>
             </a:fld>
             <a:endParaRPr lang="en-US"/>
           </a:p>
@@ -392,7 +392,7 @@
           <a:p>
             <a:fld id="{FD3EFF1E-85A1-6640-AFB9-C38833E80A84}" type="datetimeFigureOut">
               <a:rPr lang="en-US" smtClean="0"/>
-              <a:t>11/8/2020</a:t>
+              <a:t>11/19/2020</a:t>
             </a:fld>
             <a:endParaRPr lang="en-US"/>
           </a:p>
@@ -16283,8 +16283,8 @@
         </p:nvSpPr>
         <p:spPr>
           <a:xfrm>
-            <a:off x="261639" y="2800392"/>
-            <a:ext cx="5243615" cy="2031325"/>
+            <a:off x="261639" y="3109217"/>
+            <a:ext cx="5243615" cy="1477328"/>
           </a:xfrm>
           <a:prstGeom prst="rect">
             <a:avLst/>
@@ -16419,137 +16419,6 @@
               </a:rPr>
               <a:t>)</a:t>
             </a:r>
-          </a:p>
-          <a:p>
-            <a:r>
-              <a:rPr lang="en-US" sz="1800" b="0" dirty="0" err="1">
-                <a:solidFill>
-                  <a:srgbClr val="000000"/>
-                </a:solidFill>
-                <a:effectLst/>
-                <a:latin typeface="Consolas" panose="020B0609020204030204" pitchFamily="49" charset="0"/>
-              </a:rPr>
-              <a:t>motor_pair</a:t>
-            </a:r>
-            <a:r>
-              <a:rPr lang="en-US" sz="1800" b="0" dirty="0">
-                <a:solidFill>
-                  <a:srgbClr val="000000"/>
-                </a:solidFill>
-                <a:effectLst/>
-                <a:latin typeface="Consolas" panose="020B0609020204030204" pitchFamily="49" charset="0"/>
-              </a:rPr>
-              <a:t> = </a:t>
-            </a:r>
-            <a:r>
-              <a:rPr lang="en-US" sz="1800" b="0" dirty="0" err="1">
-                <a:solidFill>
-                  <a:srgbClr val="000000"/>
-                </a:solidFill>
-                <a:effectLst/>
-                <a:latin typeface="Consolas" panose="020B0609020204030204" pitchFamily="49" charset="0"/>
-              </a:rPr>
-              <a:t>MotorPair</a:t>
-            </a:r>
-            <a:r>
-              <a:rPr lang="en-US" sz="1800" b="0" dirty="0">
-                <a:solidFill>
-                  <a:srgbClr val="00877B"/>
-                </a:solidFill>
-                <a:effectLst/>
-                <a:latin typeface="Consolas" panose="020B0609020204030204" pitchFamily="49" charset="0"/>
-              </a:rPr>
-              <a:t>(</a:t>
-            </a:r>
-            <a:r>
-              <a:rPr lang="en-US" sz="1800" b="0" dirty="0">
-                <a:solidFill>
-                  <a:srgbClr val="D8009B"/>
-                </a:solidFill>
-                <a:effectLst/>
-                <a:latin typeface="Consolas" panose="020B0609020204030204" pitchFamily="49" charset="0"/>
-              </a:rPr>
-              <a:t>'A'</a:t>
-            </a:r>
-            <a:r>
-              <a:rPr lang="en-US" sz="1800" b="0" dirty="0">
-                <a:solidFill>
-                  <a:srgbClr val="000000"/>
-                </a:solidFill>
-                <a:effectLst/>
-                <a:latin typeface="Consolas" panose="020B0609020204030204" pitchFamily="49" charset="0"/>
-              </a:rPr>
-              <a:t>, </a:t>
-            </a:r>
-            <a:r>
-              <a:rPr lang="en-US" sz="1800" b="0" dirty="0">
-                <a:solidFill>
-                  <a:srgbClr val="D8009B"/>
-                </a:solidFill>
-                <a:effectLst/>
-                <a:latin typeface="Consolas" panose="020B0609020204030204" pitchFamily="49" charset="0"/>
-              </a:rPr>
-              <a:t>'E'</a:t>
-            </a:r>
-            <a:r>
-              <a:rPr lang="en-US" sz="1800" b="0" dirty="0">
-                <a:solidFill>
-                  <a:srgbClr val="00877B"/>
-                </a:solidFill>
-                <a:effectLst/>
-                <a:latin typeface="Consolas" panose="020B0609020204030204" pitchFamily="49" charset="0"/>
-              </a:rPr>
-              <a:t>)</a:t>
-            </a:r>
-          </a:p>
-          <a:p>
-            <a:r>
-              <a:rPr lang="en-GB" sz="1800" b="0" dirty="0" err="1">
-                <a:solidFill>
-                  <a:srgbClr val="000000"/>
-                </a:solidFill>
-                <a:effectLst/>
-                <a:latin typeface="Consolas" panose="020B0609020204030204" pitchFamily="49" charset="0"/>
-              </a:rPr>
-              <a:t>motor_pair.set_stop_action</a:t>
-            </a:r>
-            <a:r>
-              <a:rPr lang="en-GB" sz="1800" b="0" dirty="0">
-                <a:solidFill>
-                  <a:srgbClr val="00877B"/>
-                </a:solidFill>
-                <a:effectLst/>
-                <a:latin typeface="Consolas" panose="020B0609020204030204" pitchFamily="49" charset="0"/>
-              </a:rPr>
-              <a:t>(</a:t>
-            </a:r>
-            <a:r>
-              <a:rPr lang="en-US" sz="1800" b="0" dirty="0">
-                <a:solidFill>
-                  <a:srgbClr val="D8009B"/>
-                </a:solidFill>
-                <a:effectLst/>
-                <a:latin typeface="Consolas" panose="020B0609020204030204" pitchFamily="49" charset="0"/>
-              </a:rPr>
-              <a:t>'brake'</a:t>
-            </a:r>
-            <a:r>
-              <a:rPr lang="en-GB" sz="1800" b="0" dirty="0">
-                <a:solidFill>
-                  <a:srgbClr val="00877B"/>
-                </a:solidFill>
-                <a:effectLst/>
-                <a:latin typeface="Consolas" panose="020B0609020204030204" pitchFamily="49" charset="0"/>
-              </a:rPr>
-              <a:t>)</a:t>
-            </a:r>
-            <a:endParaRPr lang="en-US" sz="1800" b="0" dirty="0">
-              <a:solidFill>
-                <a:srgbClr val="000000"/>
-              </a:solidFill>
-              <a:effectLst/>
-              <a:latin typeface="Consolas" panose="020B0609020204030204" pitchFamily="49" charset="0"/>
-            </a:endParaRPr>
           </a:p>
           <a:p>
             <a:r>
@@ -16787,7 +16656,7 @@
           <a:effectLst/>
           <a:extLst>
             <a:ext uri="{91240B29-F687-4f45-9708-019B960494DF}">
-              <a14:hiddenLine xmlns="" xmlns:a14="http://schemas.microsoft.com/office/drawing/2010/main" w="9525">
+              <a14:hiddenLine xmlns:a14="http://schemas.microsoft.com/office/drawing/2010/main" xmlns="" w="9525">
                 <a:solidFill>
                   <a:schemeClr val="tx1"/>
                 </a:solidFill>
@@ -16797,7 +16666,7 @@
               </a14:hiddenLine>
             </a:ext>
             <a:ext uri="{AF507438-7753-43e0-B8FC-AC1667EBCBE1}">
-              <a14:hiddenEffects xmlns="" xmlns:a14="http://schemas.microsoft.com/office/drawing/2010/main">
+              <a14:hiddenEffects xmlns:a14="http://schemas.microsoft.com/office/drawing/2010/main" xmlns="">
                 <a:effectLst>
                   <a:outerShdw dist="35921" dir="2700000" algn="ctr" rotWithShape="0">
                     <a:schemeClr val="bg2"/>
@@ -17138,7 +17007,7 @@
           <a:noFill/>
           <a:extLst>
             <a:ext uri="{909E8E84-426E-40dd-AFC4-6F175D3DCCD1}">
-              <a14:hiddenFill xmlns="" xmlns:a14="http://schemas.microsoft.com/office/drawing/2010/main">
+              <a14:hiddenFill xmlns:a14="http://schemas.microsoft.com/office/drawing/2010/main" xmlns="">
                 <a:solidFill>
                   <a:srgbClr val="FFFFFF"/>
                 </a:solidFill>

</xml_diff>